<commit_message>
Modelo Relacional - Base datos
</commit_message>
<xml_diff>
--- a/JAVA/SEMANA NRO. 7/02. MENU PRINCIPAL - COMBOS - PROYECTO FINAL.pptx
+++ b/JAVA/SEMANA NRO. 7/02. MENU PRINCIPAL - COMBOS - PROYECTO FINAL.pptx
@@ -21290,7 +21290,7 @@
           <a:p>
             <a:fld id="{B6E6CCBB-7448-4D8B-97E4-07C3B3EA5E29}" type="datetimeFigureOut">
               <a:rPr lang="es-CO" smtClean="0"/>
-              <a:t>8/10/2022</a:t>
+              <a:t>9/10/2022</a:t>
             </a:fld>
             <a:endParaRPr lang="es-CO"/>
           </a:p>
@@ -21580,7 +21580,7 @@
           <p:cNvPr id="2" name="Título 1">
             <a:extLst>
               <a:ext uri="{FF2B5EF4-FFF2-40B4-BE49-F238E27FC236}">
-                <a16:creationId xmlns="" xmlns:a16="http://schemas.microsoft.com/office/drawing/2014/main" id="{393DCA57-3396-437C-A001-485CE0774BCB}"/>
+                <a16:creationId xmlns:a16="http://schemas.microsoft.com/office/drawing/2014/main" xmlns="" id="{393DCA57-3396-437C-A001-485CE0774BCB}"/>
               </a:ext>
             </a:extLst>
           </p:cNvPr>
@@ -21618,7 +21618,7 @@
           <p:cNvPr id="3" name="Subtítulo 2">
             <a:extLst>
               <a:ext uri="{FF2B5EF4-FFF2-40B4-BE49-F238E27FC236}">
-                <a16:creationId xmlns="" xmlns:a16="http://schemas.microsoft.com/office/drawing/2014/main" id="{E7C27F3B-2C4D-4B52-B702-B3BCC746E04D}"/>
+                <a16:creationId xmlns:a16="http://schemas.microsoft.com/office/drawing/2014/main" xmlns="" id="{E7C27F3B-2C4D-4B52-B702-B3BCC746E04D}"/>
               </a:ext>
             </a:extLst>
           </p:cNvPr>
@@ -21689,7 +21689,7 @@
           <p:cNvPr id="4" name="Marcador de fecha 3">
             <a:extLst>
               <a:ext uri="{FF2B5EF4-FFF2-40B4-BE49-F238E27FC236}">
-                <a16:creationId xmlns="" xmlns:a16="http://schemas.microsoft.com/office/drawing/2014/main" id="{2BC638D5-718C-4E49-9D1E-190F3C8E07C2}"/>
+                <a16:creationId xmlns:a16="http://schemas.microsoft.com/office/drawing/2014/main" xmlns="" id="{2BC638D5-718C-4E49-9D1E-190F3C8E07C2}"/>
               </a:ext>
             </a:extLst>
           </p:cNvPr>
@@ -21707,7 +21707,7 @@
           <a:p>
             <a:fld id="{20D1709E-3946-46D0-AB21-FE17C010AAA6}" type="datetimeFigureOut">
               <a:rPr lang="es-CO" smtClean="0"/>
-              <a:t>8/10/2022</a:t>
+              <a:t>9/10/2022</a:t>
             </a:fld>
             <a:endParaRPr lang="es-CO"/>
           </a:p>
@@ -21718,7 +21718,7 @@
           <p:cNvPr id="5" name="Marcador de pie de página 4">
             <a:extLst>
               <a:ext uri="{FF2B5EF4-FFF2-40B4-BE49-F238E27FC236}">
-                <a16:creationId xmlns="" xmlns:a16="http://schemas.microsoft.com/office/drawing/2014/main" id="{3276707C-FB46-45F5-818B-36FAEB8F340A}"/>
+                <a16:creationId xmlns:a16="http://schemas.microsoft.com/office/drawing/2014/main" xmlns="" id="{3276707C-FB46-45F5-818B-36FAEB8F340A}"/>
               </a:ext>
             </a:extLst>
           </p:cNvPr>
@@ -21743,7 +21743,7 @@
           <p:cNvPr id="6" name="Marcador de número de diapositiva 5">
             <a:extLst>
               <a:ext uri="{FF2B5EF4-FFF2-40B4-BE49-F238E27FC236}">
-                <a16:creationId xmlns="" xmlns:a16="http://schemas.microsoft.com/office/drawing/2014/main" id="{8FD16FDC-7D3B-42F9-BEDD-65133C487E69}"/>
+                <a16:creationId xmlns:a16="http://schemas.microsoft.com/office/drawing/2014/main" xmlns="" id="{8FD16FDC-7D3B-42F9-BEDD-65133C487E69}"/>
               </a:ext>
             </a:extLst>
           </p:cNvPr>
@@ -21772,7 +21772,7 @@
           <p:cNvPr id="12" name="Imagen 11">
             <a:extLst>
               <a:ext uri="{FF2B5EF4-FFF2-40B4-BE49-F238E27FC236}">
-                <a16:creationId xmlns="" xmlns:a16="http://schemas.microsoft.com/office/drawing/2014/main" id="{6ECC74C6-FB85-4281-8B0D-0712678A8553}"/>
+                <a16:creationId xmlns:a16="http://schemas.microsoft.com/office/drawing/2014/main" xmlns="" id="{6ECC74C6-FB85-4281-8B0D-0712678A8553}"/>
               </a:ext>
             </a:extLst>
           </p:cNvPr>
@@ -21838,7 +21838,7 @@
           <p:cNvPr id="2" name="Título 1">
             <a:extLst>
               <a:ext uri="{FF2B5EF4-FFF2-40B4-BE49-F238E27FC236}">
-                <a16:creationId xmlns="" xmlns:a16="http://schemas.microsoft.com/office/drawing/2014/main" id="{456072B7-7FDF-43D2-AF95-1C5D0BE8C2EB}"/>
+                <a16:creationId xmlns:a16="http://schemas.microsoft.com/office/drawing/2014/main" xmlns="" id="{456072B7-7FDF-43D2-AF95-1C5D0BE8C2EB}"/>
               </a:ext>
             </a:extLst>
           </p:cNvPr>
@@ -21867,7 +21867,7 @@
           <p:cNvPr id="3" name="Marcador de contenido 2">
             <a:extLst>
               <a:ext uri="{FF2B5EF4-FFF2-40B4-BE49-F238E27FC236}">
-                <a16:creationId xmlns="" xmlns:a16="http://schemas.microsoft.com/office/drawing/2014/main" id="{AC392882-4362-4C14-A359-0E232BB2FCB4}"/>
+                <a16:creationId xmlns:a16="http://schemas.microsoft.com/office/drawing/2014/main" xmlns="" id="{AC392882-4362-4C14-A359-0E232BB2FCB4}"/>
               </a:ext>
             </a:extLst>
           </p:cNvPr>
@@ -21925,7 +21925,7 @@
           <p:cNvPr id="4" name="Marcador de fecha 3">
             <a:extLst>
               <a:ext uri="{FF2B5EF4-FFF2-40B4-BE49-F238E27FC236}">
-                <a16:creationId xmlns="" xmlns:a16="http://schemas.microsoft.com/office/drawing/2014/main" id="{A7DAF922-BFAF-44E6-8AFB-FBEF3F4E2A8D}"/>
+                <a16:creationId xmlns:a16="http://schemas.microsoft.com/office/drawing/2014/main" xmlns="" id="{A7DAF922-BFAF-44E6-8AFB-FBEF3F4E2A8D}"/>
               </a:ext>
             </a:extLst>
           </p:cNvPr>
@@ -21943,7 +21943,7 @@
           <a:p>
             <a:fld id="{20D1709E-3946-46D0-AB21-FE17C010AAA6}" type="datetimeFigureOut">
               <a:rPr lang="es-CO" smtClean="0"/>
-              <a:t>8/10/2022</a:t>
+              <a:t>9/10/2022</a:t>
             </a:fld>
             <a:endParaRPr lang="es-CO"/>
           </a:p>
@@ -21954,7 +21954,7 @@
           <p:cNvPr id="5" name="Marcador de pie de página 4">
             <a:extLst>
               <a:ext uri="{FF2B5EF4-FFF2-40B4-BE49-F238E27FC236}">
-                <a16:creationId xmlns="" xmlns:a16="http://schemas.microsoft.com/office/drawing/2014/main" id="{10488B6D-8DCB-4622-84C4-C2692790C63D}"/>
+                <a16:creationId xmlns:a16="http://schemas.microsoft.com/office/drawing/2014/main" xmlns="" id="{10488B6D-8DCB-4622-84C4-C2692790C63D}"/>
               </a:ext>
             </a:extLst>
           </p:cNvPr>
@@ -21979,7 +21979,7 @@
           <p:cNvPr id="6" name="Marcador de número de diapositiva 5">
             <a:extLst>
               <a:ext uri="{FF2B5EF4-FFF2-40B4-BE49-F238E27FC236}">
-                <a16:creationId xmlns="" xmlns:a16="http://schemas.microsoft.com/office/drawing/2014/main" id="{3F24E3C1-CA2F-480F-B317-8880F18A5351}"/>
+                <a16:creationId xmlns:a16="http://schemas.microsoft.com/office/drawing/2014/main" xmlns="" id="{3F24E3C1-CA2F-480F-B317-8880F18A5351}"/>
               </a:ext>
             </a:extLst>
           </p:cNvPr>
@@ -22008,7 +22008,7 @@
           <p:cNvPr id="11" name="Imagen 10">
             <a:extLst>
               <a:ext uri="{FF2B5EF4-FFF2-40B4-BE49-F238E27FC236}">
-                <a16:creationId xmlns="" xmlns:a16="http://schemas.microsoft.com/office/drawing/2014/main" id="{5386D8B5-7850-4D65-9275-CE9653EB313D}"/>
+                <a16:creationId xmlns:a16="http://schemas.microsoft.com/office/drawing/2014/main" xmlns="" id="{5386D8B5-7850-4D65-9275-CE9653EB313D}"/>
               </a:ext>
             </a:extLst>
           </p:cNvPr>
@@ -22074,7 +22074,7 @@
           <p:cNvPr id="2" name="Título 1">
             <a:extLst>
               <a:ext uri="{FF2B5EF4-FFF2-40B4-BE49-F238E27FC236}">
-                <a16:creationId xmlns="" xmlns:a16="http://schemas.microsoft.com/office/drawing/2014/main" id="{87BD01F4-E638-4C40-8A29-56E1E3CB925E}"/>
+                <a16:creationId xmlns:a16="http://schemas.microsoft.com/office/drawing/2014/main" xmlns="" id="{87BD01F4-E638-4C40-8A29-56E1E3CB925E}"/>
               </a:ext>
             </a:extLst>
           </p:cNvPr>
@@ -22108,7 +22108,7 @@
           <p:cNvPr id="3" name="Marcador de texto 2">
             <a:extLst>
               <a:ext uri="{FF2B5EF4-FFF2-40B4-BE49-F238E27FC236}">
-                <a16:creationId xmlns="" xmlns:a16="http://schemas.microsoft.com/office/drawing/2014/main" id="{2843129E-9B5A-41BC-BCDD-ED6766FC1442}"/>
+                <a16:creationId xmlns:a16="http://schemas.microsoft.com/office/drawing/2014/main" xmlns="" id="{2843129E-9B5A-41BC-BCDD-ED6766FC1442}"/>
               </a:ext>
             </a:extLst>
           </p:cNvPr>
@@ -22179,7 +22179,7 @@
           <p:cNvPr id="4" name="Marcador de contenido 3">
             <a:extLst>
               <a:ext uri="{FF2B5EF4-FFF2-40B4-BE49-F238E27FC236}">
-                <a16:creationId xmlns="" xmlns:a16="http://schemas.microsoft.com/office/drawing/2014/main" id="{0F70F18A-9287-45A9-ABCF-96A2EDCA0051}"/>
+                <a16:creationId xmlns:a16="http://schemas.microsoft.com/office/drawing/2014/main" xmlns="" id="{0F70F18A-9287-45A9-ABCF-96A2EDCA0051}"/>
               </a:ext>
             </a:extLst>
           </p:cNvPr>
@@ -22242,7 +22242,7 @@
           <p:cNvPr id="5" name="Marcador de texto 4">
             <a:extLst>
               <a:ext uri="{FF2B5EF4-FFF2-40B4-BE49-F238E27FC236}">
-                <a16:creationId xmlns="" xmlns:a16="http://schemas.microsoft.com/office/drawing/2014/main" id="{5581F368-EF72-43BE-820C-169DE25488BB}"/>
+                <a16:creationId xmlns:a16="http://schemas.microsoft.com/office/drawing/2014/main" xmlns="" id="{5581F368-EF72-43BE-820C-169DE25488BB}"/>
               </a:ext>
             </a:extLst>
           </p:cNvPr>
@@ -22313,7 +22313,7 @@
           <p:cNvPr id="6" name="Marcador de contenido 5">
             <a:extLst>
               <a:ext uri="{FF2B5EF4-FFF2-40B4-BE49-F238E27FC236}">
-                <a16:creationId xmlns="" xmlns:a16="http://schemas.microsoft.com/office/drawing/2014/main" id="{AD16AF1A-3AE2-4D57-8BC6-6D616D949765}"/>
+                <a16:creationId xmlns:a16="http://schemas.microsoft.com/office/drawing/2014/main" xmlns="" id="{AD16AF1A-3AE2-4D57-8BC6-6D616D949765}"/>
               </a:ext>
             </a:extLst>
           </p:cNvPr>
@@ -22376,7 +22376,7 @@
           <p:cNvPr id="7" name="Marcador de fecha 6">
             <a:extLst>
               <a:ext uri="{FF2B5EF4-FFF2-40B4-BE49-F238E27FC236}">
-                <a16:creationId xmlns="" xmlns:a16="http://schemas.microsoft.com/office/drawing/2014/main" id="{EF89162C-18BA-4599-A8AB-FC4ECB05A9EB}"/>
+                <a16:creationId xmlns:a16="http://schemas.microsoft.com/office/drawing/2014/main" xmlns="" id="{EF89162C-18BA-4599-A8AB-FC4ECB05A9EB}"/>
               </a:ext>
             </a:extLst>
           </p:cNvPr>
@@ -22394,7 +22394,7 @@
           <a:p>
             <a:fld id="{20D1709E-3946-46D0-AB21-FE17C010AAA6}" type="datetimeFigureOut">
               <a:rPr lang="es-CO" smtClean="0"/>
-              <a:t>8/10/2022</a:t>
+              <a:t>9/10/2022</a:t>
             </a:fld>
             <a:endParaRPr lang="es-CO"/>
           </a:p>
@@ -22405,7 +22405,7 @@
           <p:cNvPr id="8" name="Marcador de pie de página 7">
             <a:extLst>
               <a:ext uri="{FF2B5EF4-FFF2-40B4-BE49-F238E27FC236}">
-                <a16:creationId xmlns="" xmlns:a16="http://schemas.microsoft.com/office/drawing/2014/main" id="{70D7B2D2-1F66-462C-AD23-8E19AB2DFBBF}"/>
+                <a16:creationId xmlns:a16="http://schemas.microsoft.com/office/drawing/2014/main" xmlns="" id="{70D7B2D2-1F66-462C-AD23-8E19AB2DFBBF}"/>
               </a:ext>
             </a:extLst>
           </p:cNvPr>
@@ -22430,7 +22430,7 @@
           <p:cNvPr id="9" name="Marcador de número de diapositiva 8">
             <a:extLst>
               <a:ext uri="{FF2B5EF4-FFF2-40B4-BE49-F238E27FC236}">
-                <a16:creationId xmlns="" xmlns:a16="http://schemas.microsoft.com/office/drawing/2014/main" id="{1EE87630-B1CC-4ED9-B600-2B166DF97A2E}"/>
+                <a16:creationId xmlns:a16="http://schemas.microsoft.com/office/drawing/2014/main" xmlns="" id="{1EE87630-B1CC-4ED9-B600-2B166DF97A2E}"/>
               </a:ext>
             </a:extLst>
           </p:cNvPr>
@@ -22459,7 +22459,7 @@
           <p:cNvPr id="12" name="Imagen 11">
             <a:extLst>
               <a:ext uri="{FF2B5EF4-FFF2-40B4-BE49-F238E27FC236}">
-                <a16:creationId xmlns="" xmlns:a16="http://schemas.microsoft.com/office/drawing/2014/main" id="{DFE53075-3556-4CE1-B0EB-9D68612443C0}"/>
+                <a16:creationId xmlns:a16="http://schemas.microsoft.com/office/drawing/2014/main" xmlns="" id="{DFE53075-3556-4CE1-B0EB-9D68612443C0}"/>
               </a:ext>
             </a:extLst>
           </p:cNvPr>
@@ -22525,7 +22525,7 @@
           <p:cNvPr id="2" name="Título 1">
             <a:extLst>
               <a:ext uri="{FF2B5EF4-FFF2-40B4-BE49-F238E27FC236}">
-                <a16:creationId xmlns="" xmlns:a16="http://schemas.microsoft.com/office/drawing/2014/main" id="{05448947-C141-41FF-AE16-195BB2A7CBFE}"/>
+                <a16:creationId xmlns:a16="http://schemas.microsoft.com/office/drawing/2014/main" xmlns="" id="{05448947-C141-41FF-AE16-195BB2A7CBFE}"/>
               </a:ext>
             </a:extLst>
           </p:cNvPr>
@@ -22554,7 +22554,7 @@
           <p:cNvPr id="3" name="Marcador de fecha 2">
             <a:extLst>
               <a:ext uri="{FF2B5EF4-FFF2-40B4-BE49-F238E27FC236}">
-                <a16:creationId xmlns="" xmlns:a16="http://schemas.microsoft.com/office/drawing/2014/main" id="{0ED10905-2E74-417D-B07D-7B1A9F8BA4DC}"/>
+                <a16:creationId xmlns:a16="http://schemas.microsoft.com/office/drawing/2014/main" xmlns="" id="{0ED10905-2E74-417D-B07D-7B1A9F8BA4DC}"/>
               </a:ext>
             </a:extLst>
           </p:cNvPr>
@@ -22572,7 +22572,7 @@
           <a:p>
             <a:fld id="{20D1709E-3946-46D0-AB21-FE17C010AAA6}" type="datetimeFigureOut">
               <a:rPr lang="es-CO" smtClean="0"/>
-              <a:t>8/10/2022</a:t>
+              <a:t>9/10/2022</a:t>
             </a:fld>
             <a:endParaRPr lang="es-CO"/>
           </a:p>
@@ -22583,7 +22583,7 @@
           <p:cNvPr id="4" name="Marcador de pie de página 3">
             <a:extLst>
               <a:ext uri="{FF2B5EF4-FFF2-40B4-BE49-F238E27FC236}">
-                <a16:creationId xmlns="" xmlns:a16="http://schemas.microsoft.com/office/drawing/2014/main" id="{CB6C416F-B3BB-4307-8987-A5AA610D406B}"/>
+                <a16:creationId xmlns:a16="http://schemas.microsoft.com/office/drawing/2014/main" xmlns="" id="{CB6C416F-B3BB-4307-8987-A5AA610D406B}"/>
               </a:ext>
             </a:extLst>
           </p:cNvPr>
@@ -22608,7 +22608,7 @@
           <p:cNvPr id="5" name="Marcador de número de diapositiva 4">
             <a:extLst>
               <a:ext uri="{FF2B5EF4-FFF2-40B4-BE49-F238E27FC236}">
-                <a16:creationId xmlns="" xmlns:a16="http://schemas.microsoft.com/office/drawing/2014/main" id="{E8C6C406-C9B3-4E42-BD8D-E43FE8E43BDA}"/>
+                <a16:creationId xmlns:a16="http://schemas.microsoft.com/office/drawing/2014/main" xmlns="" id="{E8C6C406-C9B3-4E42-BD8D-E43FE8E43BDA}"/>
               </a:ext>
             </a:extLst>
           </p:cNvPr>
@@ -22637,7 +22637,7 @@
           <p:cNvPr id="8" name="Imagen 7">
             <a:extLst>
               <a:ext uri="{FF2B5EF4-FFF2-40B4-BE49-F238E27FC236}">
-                <a16:creationId xmlns="" xmlns:a16="http://schemas.microsoft.com/office/drawing/2014/main" id="{5E3C3009-66A0-4C0E-8DD7-1CDE9C96BA2E}"/>
+                <a16:creationId xmlns:a16="http://schemas.microsoft.com/office/drawing/2014/main" xmlns="" id="{5E3C3009-66A0-4C0E-8DD7-1CDE9C96BA2E}"/>
               </a:ext>
             </a:extLst>
           </p:cNvPr>
@@ -22703,7 +22703,7 @@
           <p:cNvPr id="2" name="Título 1">
             <a:extLst>
               <a:ext uri="{FF2B5EF4-FFF2-40B4-BE49-F238E27FC236}">
-                <a16:creationId xmlns="" xmlns:a16="http://schemas.microsoft.com/office/drawing/2014/main" id="{863D4DF8-E9EF-4922-B438-331196DC1E02}"/>
+                <a16:creationId xmlns:a16="http://schemas.microsoft.com/office/drawing/2014/main" xmlns="" id="{863D4DF8-E9EF-4922-B438-331196DC1E02}"/>
               </a:ext>
             </a:extLst>
           </p:cNvPr>
@@ -22741,7 +22741,7 @@
           <p:cNvPr id="3" name="Marcador de contenido 2">
             <a:extLst>
               <a:ext uri="{FF2B5EF4-FFF2-40B4-BE49-F238E27FC236}">
-                <a16:creationId xmlns="" xmlns:a16="http://schemas.microsoft.com/office/drawing/2014/main" id="{5BF20047-CFC6-4FF5-A38F-0EBCC2F6F6D3}"/>
+                <a16:creationId xmlns:a16="http://schemas.microsoft.com/office/drawing/2014/main" xmlns="" id="{5BF20047-CFC6-4FF5-A38F-0EBCC2F6F6D3}"/>
               </a:ext>
             </a:extLst>
           </p:cNvPr>
@@ -22832,7 +22832,7 @@
           <p:cNvPr id="4" name="Marcador de texto 3">
             <a:extLst>
               <a:ext uri="{FF2B5EF4-FFF2-40B4-BE49-F238E27FC236}">
-                <a16:creationId xmlns="" xmlns:a16="http://schemas.microsoft.com/office/drawing/2014/main" id="{C2F085C8-93F1-4BE0-90CB-99FF6BCAA44E}"/>
+                <a16:creationId xmlns:a16="http://schemas.microsoft.com/office/drawing/2014/main" xmlns="" id="{C2F085C8-93F1-4BE0-90CB-99FF6BCAA44E}"/>
               </a:ext>
             </a:extLst>
           </p:cNvPr>
@@ -22903,7 +22903,7 @@
           <p:cNvPr id="5" name="Marcador de fecha 4">
             <a:extLst>
               <a:ext uri="{FF2B5EF4-FFF2-40B4-BE49-F238E27FC236}">
-                <a16:creationId xmlns="" xmlns:a16="http://schemas.microsoft.com/office/drawing/2014/main" id="{177A5E3B-651B-4CA4-B2B7-24787CADE4A2}"/>
+                <a16:creationId xmlns:a16="http://schemas.microsoft.com/office/drawing/2014/main" xmlns="" id="{177A5E3B-651B-4CA4-B2B7-24787CADE4A2}"/>
               </a:ext>
             </a:extLst>
           </p:cNvPr>
@@ -22921,7 +22921,7 @@
           <a:p>
             <a:fld id="{20D1709E-3946-46D0-AB21-FE17C010AAA6}" type="datetimeFigureOut">
               <a:rPr lang="es-CO" smtClean="0"/>
-              <a:t>8/10/2022</a:t>
+              <a:t>9/10/2022</a:t>
             </a:fld>
             <a:endParaRPr lang="es-CO"/>
           </a:p>
@@ -22932,7 +22932,7 @@
           <p:cNvPr id="6" name="Marcador de pie de página 5">
             <a:extLst>
               <a:ext uri="{FF2B5EF4-FFF2-40B4-BE49-F238E27FC236}">
-                <a16:creationId xmlns="" xmlns:a16="http://schemas.microsoft.com/office/drawing/2014/main" id="{9EDB5E4A-F2FF-4F0E-BF61-8464EBD5D35B}"/>
+                <a16:creationId xmlns:a16="http://schemas.microsoft.com/office/drawing/2014/main" xmlns="" id="{9EDB5E4A-F2FF-4F0E-BF61-8464EBD5D35B}"/>
               </a:ext>
             </a:extLst>
           </p:cNvPr>
@@ -22957,7 +22957,7 @@
           <p:cNvPr id="7" name="Marcador de número de diapositiva 6">
             <a:extLst>
               <a:ext uri="{FF2B5EF4-FFF2-40B4-BE49-F238E27FC236}">
-                <a16:creationId xmlns="" xmlns:a16="http://schemas.microsoft.com/office/drawing/2014/main" id="{8BDDFA75-3CCE-4C71-822A-27DAF0E16D56}"/>
+                <a16:creationId xmlns:a16="http://schemas.microsoft.com/office/drawing/2014/main" xmlns="" id="{8BDDFA75-3CCE-4C71-822A-27DAF0E16D56}"/>
               </a:ext>
             </a:extLst>
           </p:cNvPr>
@@ -22986,7 +22986,7 @@
           <p:cNvPr id="11" name="Imagen 10">
             <a:extLst>
               <a:ext uri="{FF2B5EF4-FFF2-40B4-BE49-F238E27FC236}">
-                <a16:creationId xmlns="" xmlns:a16="http://schemas.microsoft.com/office/drawing/2014/main" id="{9B93726F-C1AD-4C18-B397-177B4D15514A}"/>
+                <a16:creationId xmlns:a16="http://schemas.microsoft.com/office/drawing/2014/main" xmlns="" id="{9B93726F-C1AD-4C18-B397-177B4D15514A}"/>
               </a:ext>
             </a:extLst>
           </p:cNvPr>
@@ -23052,7 +23052,7 @@
           <p:cNvPr id="2" name="Título 1">
             <a:extLst>
               <a:ext uri="{FF2B5EF4-FFF2-40B4-BE49-F238E27FC236}">
-                <a16:creationId xmlns="" xmlns:a16="http://schemas.microsoft.com/office/drawing/2014/main" id="{1398CF09-B240-4EC0-A3FA-6FB270B31D45}"/>
+                <a16:creationId xmlns:a16="http://schemas.microsoft.com/office/drawing/2014/main" xmlns="" id="{1398CF09-B240-4EC0-A3FA-6FB270B31D45}"/>
               </a:ext>
             </a:extLst>
           </p:cNvPr>
@@ -23090,7 +23090,7 @@
           <p:cNvPr id="3" name="Marcador de posición de imagen 2">
             <a:extLst>
               <a:ext uri="{FF2B5EF4-FFF2-40B4-BE49-F238E27FC236}">
-                <a16:creationId xmlns="" xmlns:a16="http://schemas.microsoft.com/office/drawing/2014/main" id="{E97EC6F1-A744-41A5-857F-DC45F453EA0B}"/>
+                <a16:creationId xmlns:a16="http://schemas.microsoft.com/office/drawing/2014/main" xmlns="" id="{E97EC6F1-A744-41A5-857F-DC45F453EA0B}"/>
               </a:ext>
             </a:extLst>
           </p:cNvPr>
@@ -23157,7 +23157,7 @@
           <p:cNvPr id="4" name="Marcador de texto 3">
             <a:extLst>
               <a:ext uri="{FF2B5EF4-FFF2-40B4-BE49-F238E27FC236}">
-                <a16:creationId xmlns="" xmlns:a16="http://schemas.microsoft.com/office/drawing/2014/main" id="{84055C9C-807D-4F2B-B335-19FD2C025637}"/>
+                <a16:creationId xmlns:a16="http://schemas.microsoft.com/office/drawing/2014/main" xmlns="" id="{84055C9C-807D-4F2B-B335-19FD2C025637}"/>
               </a:ext>
             </a:extLst>
           </p:cNvPr>
@@ -23228,7 +23228,7 @@
           <p:cNvPr id="5" name="Marcador de fecha 4">
             <a:extLst>
               <a:ext uri="{FF2B5EF4-FFF2-40B4-BE49-F238E27FC236}">
-                <a16:creationId xmlns="" xmlns:a16="http://schemas.microsoft.com/office/drawing/2014/main" id="{304120D9-3139-4247-8249-76C6B65EE3D5}"/>
+                <a16:creationId xmlns:a16="http://schemas.microsoft.com/office/drawing/2014/main" xmlns="" id="{304120D9-3139-4247-8249-76C6B65EE3D5}"/>
               </a:ext>
             </a:extLst>
           </p:cNvPr>
@@ -23246,7 +23246,7 @@
           <a:p>
             <a:fld id="{20D1709E-3946-46D0-AB21-FE17C010AAA6}" type="datetimeFigureOut">
               <a:rPr lang="es-CO" smtClean="0"/>
-              <a:t>8/10/2022</a:t>
+              <a:t>9/10/2022</a:t>
             </a:fld>
             <a:endParaRPr lang="es-CO"/>
           </a:p>
@@ -23257,7 +23257,7 @@
           <p:cNvPr id="6" name="Marcador de pie de página 5">
             <a:extLst>
               <a:ext uri="{FF2B5EF4-FFF2-40B4-BE49-F238E27FC236}">
-                <a16:creationId xmlns="" xmlns:a16="http://schemas.microsoft.com/office/drawing/2014/main" id="{575D8828-E5CD-4AFE-BACF-01C67A985695}"/>
+                <a16:creationId xmlns:a16="http://schemas.microsoft.com/office/drawing/2014/main" xmlns="" id="{575D8828-E5CD-4AFE-BACF-01C67A985695}"/>
               </a:ext>
             </a:extLst>
           </p:cNvPr>
@@ -23282,7 +23282,7 @@
           <p:cNvPr id="7" name="Marcador de número de diapositiva 6">
             <a:extLst>
               <a:ext uri="{FF2B5EF4-FFF2-40B4-BE49-F238E27FC236}">
-                <a16:creationId xmlns="" xmlns:a16="http://schemas.microsoft.com/office/drawing/2014/main" id="{48BBD036-3290-4630-8438-99FA0E26C84F}"/>
+                <a16:creationId xmlns:a16="http://schemas.microsoft.com/office/drawing/2014/main" xmlns="" id="{48BBD036-3290-4630-8438-99FA0E26C84F}"/>
               </a:ext>
             </a:extLst>
           </p:cNvPr>
@@ -23341,7 +23341,7 @@
           <p:cNvPr id="2" name="Título 1">
             <a:extLst>
               <a:ext uri="{FF2B5EF4-FFF2-40B4-BE49-F238E27FC236}">
-                <a16:creationId xmlns="" xmlns:a16="http://schemas.microsoft.com/office/drawing/2014/main" id="{8609E4E6-8C80-4BBE-90B5-E8B5EEE77870}"/>
+                <a16:creationId xmlns:a16="http://schemas.microsoft.com/office/drawing/2014/main" xmlns="" id="{8609E4E6-8C80-4BBE-90B5-E8B5EEE77870}"/>
               </a:ext>
             </a:extLst>
           </p:cNvPr>
@@ -23370,7 +23370,7 @@
           <p:cNvPr id="3" name="Marcador de texto vertical 2">
             <a:extLst>
               <a:ext uri="{FF2B5EF4-FFF2-40B4-BE49-F238E27FC236}">
-                <a16:creationId xmlns="" xmlns:a16="http://schemas.microsoft.com/office/drawing/2014/main" id="{F3D945BE-87B4-4408-8223-C10225FCD11D}"/>
+                <a16:creationId xmlns:a16="http://schemas.microsoft.com/office/drawing/2014/main" xmlns="" id="{F3D945BE-87B4-4408-8223-C10225FCD11D}"/>
               </a:ext>
             </a:extLst>
           </p:cNvPr>
@@ -23428,7 +23428,7 @@
           <p:cNvPr id="4" name="Marcador de fecha 3">
             <a:extLst>
               <a:ext uri="{FF2B5EF4-FFF2-40B4-BE49-F238E27FC236}">
-                <a16:creationId xmlns="" xmlns:a16="http://schemas.microsoft.com/office/drawing/2014/main" id="{CDC3E86A-F4EC-451F-BB90-76AC435D6089}"/>
+                <a16:creationId xmlns:a16="http://schemas.microsoft.com/office/drawing/2014/main" xmlns="" id="{CDC3E86A-F4EC-451F-BB90-76AC435D6089}"/>
               </a:ext>
             </a:extLst>
           </p:cNvPr>
@@ -23446,7 +23446,7 @@
           <a:p>
             <a:fld id="{20D1709E-3946-46D0-AB21-FE17C010AAA6}" type="datetimeFigureOut">
               <a:rPr lang="es-CO" smtClean="0"/>
-              <a:t>8/10/2022</a:t>
+              <a:t>9/10/2022</a:t>
             </a:fld>
             <a:endParaRPr lang="es-CO"/>
           </a:p>
@@ -23457,7 +23457,7 @@
           <p:cNvPr id="5" name="Marcador de pie de página 4">
             <a:extLst>
               <a:ext uri="{FF2B5EF4-FFF2-40B4-BE49-F238E27FC236}">
-                <a16:creationId xmlns="" xmlns:a16="http://schemas.microsoft.com/office/drawing/2014/main" id="{94786CB3-BE03-4373-991A-6677CBEBFF7F}"/>
+                <a16:creationId xmlns:a16="http://schemas.microsoft.com/office/drawing/2014/main" xmlns="" id="{94786CB3-BE03-4373-991A-6677CBEBFF7F}"/>
               </a:ext>
             </a:extLst>
           </p:cNvPr>
@@ -23482,7 +23482,7 @@
           <p:cNvPr id="6" name="Marcador de número de diapositiva 5">
             <a:extLst>
               <a:ext uri="{FF2B5EF4-FFF2-40B4-BE49-F238E27FC236}">
-                <a16:creationId xmlns="" xmlns:a16="http://schemas.microsoft.com/office/drawing/2014/main" id="{D057D65D-096A-4900-B1C4-2505C2DBBCC6}"/>
+                <a16:creationId xmlns:a16="http://schemas.microsoft.com/office/drawing/2014/main" xmlns="" id="{D057D65D-096A-4900-B1C4-2505C2DBBCC6}"/>
               </a:ext>
             </a:extLst>
           </p:cNvPr>
@@ -23541,7 +23541,7 @@
           <p:cNvPr id="2" name="Título vertical 1">
             <a:extLst>
               <a:ext uri="{FF2B5EF4-FFF2-40B4-BE49-F238E27FC236}">
-                <a16:creationId xmlns="" xmlns:a16="http://schemas.microsoft.com/office/drawing/2014/main" id="{49CF5996-F102-4C35-88AC-0BCE5E7C99B9}"/>
+                <a16:creationId xmlns:a16="http://schemas.microsoft.com/office/drawing/2014/main" xmlns="" id="{49CF5996-F102-4C35-88AC-0BCE5E7C99B9}"/>
               </a:ext>
             </a:extLst>
           </p:cNvPr>
@@ -23575,7 +23575,7 @@
           <p:cNvPr id="3" name="Marcador de texto vertical 2">
             <a:extLst>
               <a:ext uri="{FF2B5EF4-FFF2-40B4-BE49-F238E27FC236}">
-                <a16:creationId xmlns="" xmlns:a16="http://schemas.microsoft.com/office/drawing/2014/main" id="{14A6057D-4BD4-4035-BA06-873DD4ACEE6B}"/>
+                <a16:creationId xmlns:a16="http://schemas.microsoft.com/office/drawing/2014/main" xmlns="" id="{14A6057D-4BD4-4035-BA06-873DD4ACEE6B}"/>
               </a:ext>
             </a:extLst>
           </p:cNvPr>
@@ -23638,7 +23638,7 @@
           <p:cNvPr id="4" name="Marcador de fecha 3">
             <a:extLst>
               <a:ext uri="{FF2B5EF4-FFF2-40B4-BE49-F238E27FC236}">
-                <a16:creationId xmlns="" xmlns:a16="http://schemas.microsoft.com/office/drawing/2014/main" id="{A7DC9021-E32F-4B8E-BB06-5A91B194A9C7}"/>
+                <a16:creationId xmlns:a16="http://schemas.microsoft.com/office/drawing/2014/main" xmlns="" id="{A7DC9021-E32F-4B8E-BB06-5A91B194A9C7}"/>
               </a:ext>
             </a:extLst>
           </p:cNvPr>
@@ -23656,7 +23656,7 @@
           <a:p>
             <a:fld id="{20D1709E-3946-46D0-AB21-FE17C010AAA6}" type="datetimeFigureOut">
               <a:rPr lang="es-CO" smtClean="0"/>
-              <a:t>8/10/2022</a:t>
+              <a:t>9/10/2022</a:t>
             </a:fld>
             <a:endParaRPr lang="es-CO"/>
           </a:p>
@@ -23667,7 +23667,7 @@
           <p:cNvPr id="5" name="Marcador de pie de página 4">
             <a:extLst>
               <a:ext uri="{FF2B5EF4-FFF2-40B4-BE49-F238E27FC236}">
-                <a16:creationId xmlns="" xmlns:a16="http://schemas.microsoft.com/office/drawing/2014/main" id="{307F9F3F-1E42-4E06-AC36-8C41E60C5E4C}"/>
+                <a16:creationId xmlns:a16="http://schemas.microsoft.com/office/drawing/2014/main" xmlns="" id="{307F9F3F-1E42-4E06-AC36-8C41E60C5E4C}"/>
               </a:ext>
             </a:extLst>
           </p:cNvPr>
@@ -23692,7 +23692,7 @@
           <p:cNvPr id="6" name="Marcador de número de diapositiva 5">
             <a:extLst>
               <a:ext uri="{FF2B5EF4-FFF2-40B4-BE49-F238E27FC236}">
-                <a16:creationId xmlns="" xmlns:a16="http://schemas.microsoft.com/office/drawing/2014/main" id="{1C483B2D-7AE1-4B39-9D56-05D8599E0622}"/>
+                <a16:creationId xmlns:a16="http://schemas.microsoft.com/office/drawing/2014/main" xmlns="" id="{1C483B2D-7AE1-4B39-9D56-05D8599E0622}"/>
               </a:ext>
             </a:extLst>
           </p:cNvPr>
@@ -23756,7 +23756,7 @@
           <p:cNvPr id="2" name="Marcador de título 1">
             <a:extLst>
               <a:ext uri="{FF2B5EF4-FFF2-40B4-BE49-F238E27FC236}">
-                <a16:creationId xmlns="" xmlns:a16="http://schemas.microsoft.com/office/drawing/2014/main" id="{9D2B8E4D-B0A5-4F6D-B70B-9F893340C85A}"/>
+                <a16:creationId xmlns:a16="http://schemas.microsoft.com/office/drawing/2014/main" xmlns="" id="{9D2B8E4D-B0A5-4F6D-B70B-9F893340C85A}"/>
               </a:ext>
             </a:extLst>
           </p:cNvPr>
@@ -23795,7 +23795,7 @@
           <p:cNvPr id="3" name="Marcador de texto 2">
             <a:extLst>
               <a:ext uri="{FF2B5EF4-FFF2-40B4-BE49-F238E27FC236}">
-                <a16:creationId xmlns="" xmlns:a16="http://schemas.microsoft.com/office/drawing/2014/main" id="{92357C1C-D705-428A-8937-D01499D7293D}"/>
+                <a16:creationId xmlns:a16="http://schemas.microsoft.com/office/drawing/2014/main" xmlns="" id="{92357C1C-D705-428A-8937-D01499D7293D}"/>
               </a:ext>
             </a:extLst>
           </p:cNvPr>
@@ -23863,7 +23863,7 @@
           <p:cNvPr id="4" name="Marcador de fecha 3">
             <a:extLst>
               <a:ext uri="{FF2B5EF4-FFF2-40B4-BE49-F238E27FC236}">
-                <a16:creationId xmlns="" xmlns:a16="http://schemas.microsoft.com/office/drawing/2014/main" id="{BB18BA03-5208-414F-8E95-0899202B3CBF}"/>
+                <a16:creationId xmlns:a16="http://schemas.microsoft.com/office/drawing/2014/main" xmlns="" id="{BB18BA03-5208-414F-8E95-0899202B3CBF}"/>
               </a:ext>
             </a:extLst>
           </p:cNvPr>
@@ -23899,7 +23899,7 @@
           <a:p>
             <a:fld id="{20D1709E-3946-46D0-AB21-FE17C010AAA6}" type="datetimeFigureOut">
               <a:rPr lang="es-CO" smtClean="0"/>
-              <a:t>8/10/2022</a:t>
+              <a:t>9/10/2022</a:t>
             </a:fld>
             <a:endParaRPr lang="es-CO"/>
           </a:p>
@@ -23910,7 +23910,7 @@
           <p:cNvPr id="5" name="Marcador de pie de página 4">
             <a:extLst>
               <a:ext uri="{FF2B5EF4-FFF2-40B4-BE49-F238E27FC236}">
-                <a16:creationId xmlns="" xmlns:a16="http://schemas.microsoft.com/office/drawing/2014/main" id="{1B7E278C-CD3B-4BC7-819E-778C1B9ABDB8}"/>
+                <a16:creationId xmlns:a16="http://schemas.microsoft.com/office/drawing/2014/main" xmlns="" id="{1B7E278C-CD3B-4BC7-819E-778C1B9ABDB8}"/>
               </a:ext>
             </a:extLst>
           </p:cNvPr>
@@ -23953,7 +23953,7 @@
           <p:cNvPr id="6" name="Marcador de número de diapositiva 5">
             <a:extLst>
               <a:ext uri="{FF2B5EF4-FFF2-40B4-BE49-F238E27FC236}">
-                <a16:creationId xmlns="" xmlns:a16="http://schemas.microsoft.com/office/drawing/2014/main" id="{9B600AEB-434C-4C8A-A432-D9D84203E290}"/>
+                <a16:creationId xmlns:a16="http://schemas.microsoft.com/office/drawing/2014/main" xmlns="" id="{9B600AEB-434C-4C8A-A432-D9D84203E290}"/>
               </a:ext>
             </a:extLst>
           </p:cNvPr>
@@ -24318,7 +24318,7 @@
           <p:cNvPr id="4" name="Título 1">
             <a:extLst>
               <a:ext uri="{FF2B5EF4-FFF2-40B4-BE49-F238E27FC236}">
-                <a16:creationId xmlns="" xmlns:a16="http://schemas.microsoft.com/office/drawing/2014/main" id="{1334CBD3-A99C-41E8-9883-E9DA6A3829FF}"/>
+                <a16:creationId xmlns:a16="http://schemas.microsoft.com/office/drawing/2014/main" xmlns="" id="{1334CBD3-A99C-41E8-9883-E9DA6A3829FF}"/>
               </a:ext>
             </a:extLst>
           </p:cNvPr>
@@ -24394,7 +24394,7 @@
           <p:cNvPr id="5" name="Rectángulo 4">
             <a:extLst>
               <a:ext uri="{FF2B5EF4-FFF2-40B4-BE49-F238E27FC236}">
-                <a16:creationId xmlns="" xmlns:a16="http://schemas.microsoft.com/office/drawing/2014/main" id="{0CAE8DAB-AA51-4AAF-B433-545B03406555}"/>
+                <a16:creationId xmlns:a16="http://schemas.microsoft.com/office/drawing/2014/main" xmlns="" id="{0CAE8DAB-AA51-4AAF-B433-545B03406555}"/>
               </a:ext>
             </a:extLst>
           </p:cNvPr>
@@ -24449,7 +24449,7 @@
           <p:cNvPr id="6" name="CuadroTexto 5">
             <a:extLst>
               <a:ext uri="{FF2B5EF4-FFF2-40B4-BE49-F238E27FC236}">
-                <a16:creationId xmlns="" xmlns:a16="http://schemas.microsoft.com/office/drawing/2014/main" id="{20F98B3C-495B-4D19-8AEA-15E1C2591533}"/>
+                <a16:creationId xmlns:a16="http://schemas.microsoft.com/office/drawing/2014/main" xmlns="" id="{20F98B3C-495B-4D19-8AEA-15E1C2591533}"/>
               </a:ext>
             </a:extLst>
           </p:cNvPr>
@@ -24495,7 +24495,7 @@
           <p:cNvPr id="7" name="2 Marcador de texto">
             <a:extLst>
               <a:ext uri="{FF2B5EF4-FFF2-40B4-BE49-F238E27FC236}">
-                <a16:creationId xmlns="" xmlns:a16="http://schemas.microsoft.com/office/drawing/2014/main" id="{4185A630-10D0-4A68-B775-CDEA3FC338CC}"/>
+                <a16:creationId xmlns:a16="http://schemas.microsoft.com/office/drawing/2014/main" xmlns="" id="{4185A630-10D0-4A68-B775-CDEA3FC338CC}"/>
               </a:ext>
             </a:extLst>
           </p:cNvPr>
@@ -24718,7 +24718,7 @@
                 <a:hlinkClick r:id="rId3">
                   <a:extLst>
                     <a:ext uri="{A12FA001-AC4F-418D-AE19-62706E023703}">
-                      <ahyp:hlinkClr xmlns="" xmlns:ahyp="http://schemas.microsoft.com/office/drawing/2018/hyperlinkcolor" val="tx"/>
+                      <ahyp:hlinkClr xmlns:ahyp="http://schemas.microsoft.com/office/drawing/2018/hyperlinkcolor" xmlns="" val="tx"/>
                     </a:ext>
                   </a:extLst>
                 </a:hlinkClick>
@@ -24742,7 +24742,7 @@
           <p:cNvPr id="8" name="Group 3162">
             <a:extLst>
               <a:ext uri="{FF2B5EF4-FFF2-40B4-BE49-F238E27FC236}">
-                <a16:creationId xmlns="" xmlns:a16="http://schemas.microsoft.com/office/drawing/2014/main" id="{F6E59D80-076C-4696-A8CA-B30D77AEDCFC}"/>
+                <a16:creationId xmlns:a16="http://schemas.microsoft.com/office/drawing/2014/main" xmlns="" id="{F6E59D80-076C-4696-A8CA-B30D77AEDCFC}"/>
               </a:ext>
             </a:extLst>
           </p:cNvPr>
@@ -24762,7 +24762,7 @@
             <p:cNvPr id="9" name="Freeform 99">
               <a:extLst>
                 <a:ext uri="{FF2B5EF4-FFF2-40B4-BE49-F238E27FC236}">
-                  <a16:creationId xmlns="" xmlns:a16="http://schemas.microsoft.com/office/drawing/2014/main" id="{AC9D8E6B-9386-4529-8B1A-5F6C4064D693}"/>
+                  <a16:creationId xmlns:a16="http://schemas.microsoft.com/office/drawing/2014/main" xmlns="" id="{AC9D8E6B-9386-4529-8B1A-5F6C4064D693}"/>
                 </a:ext>
               </a:extLst>
             </p:cNvPr>
@@ -24914,7 +24914,7 @@
             <p:cNvPr id="10" name="Freeform 100">
               <a:extLst>
                 <a:ext uri="{FF2B5EF4-FFF2-40B4-BE49-F238E27FC236}">
-                  <a16:creationId xmlns="" xmlns:a16="http://schemas.microsoft.com/office/drawing/2014/main" id="{1BE1621F-DEA9-4744-AF45-C3B17B22D0A5}"/>
+                  <a16:creationId xmlns:a16="http://schemas.microsoft.com/office/drawing/2014/main" xmlns="" id="{1BE1621F-DEA9-4744-AF45-C3B17B22D0A5}"/>
                 </a:ext>
               </a:extLst>
             </p:cNvPr>
@@ -25096,7 +25096,7 @@
             <p:cNvPr id="11" name="Freeform 101">
               <a:extLst>
                 <a:ext uri="{FF2B5EF4-FFF2-40B4-BE49-F238E27FC236}">
-                  <a16:creationId xmlns="" xmlns:a16="http://schemas.microsoft.com/office/drawing/2014/main" id="{B5F1F7B1-8E8D-4FDB-86DB-4B0D68CBD359}"/>
+                  <a16:creationId xmlns:a16="http://schemas.microsoft.com/office/drawing/2014/main" xmlns="" id="{B5F1F7B1-8E8D-4FDB-86DB-4B0D68CBD359}"/>
                 </a:ext>
               </a:extLst>
             </p:cNvPr>
@@ -25288,7 +25288,7 @@
             <p:cNvPr id="12" name="Freeform 102">
               <a:extLst>
                 <a:ext uri="{FF2B5EF4-FFF2-40B4-BE49-F238E27FC236}">
-                  <a16:creationId xmlns="" xmlns:a16="http://schemas.microsoft.com/office/drawing/2014/main" id="{6E88E6C0-7894-41EE-B6E1-E22230BADB87}"/>
+                  <a16:creationId xmlns:a16="http://schemas.microsoft.com/office/drawing/2014/main" xmlns="" id="{6E88E6C0-7894-41EE-B6E1-E22230BADB87}"/>
                 </a:ext>
               </a:extLst>
             </p:cNvPr>
@@ -25470,7 +25470,7 @@
             <p:cNvPr id="13" name="Freeform 103">
               <a:extLst>
                 <a:ext uri="{FF2B5EF4-FFF2-40B4-BE49-F238E27FC236}">
-                  <a16:creationId xmlns="" xmlns:a16="http://schemas.microsoft.com/office/drawing/2014/main" id="{120BF1D0-D66A-4B60-B667-A9CA53321444}"/>
+                  <a16:creationId xmlns:a16="http://schemas.microsoft.com/office/drawing/2014/main" xmlns="" id="{120BF1D0-D66A-4B60-B667-A9CA53321444}"/>
                 </a:ext>
               </a:extLst>
             </p:cNvPr>
@@ -25652,7 +25652,7 @@
             <p:cNvPr id="14" name="Freeform 104">
               <a:extLst>
                 <a:ext uri="{FF2B5EF4-FFF2-40B4-BE49-F238E27FC236}">
-                  <a16:creationId xmlns="" xmlns:a16="http://schemas.microsoft.com/office/drawing/2014/main" id="{CAD4AEF5-B2E4-4DAC-BA85-BD6524903309}"/>
+                  <a16:creationId xmlns:a16="http://schemas.microsoft.com/office/drawing/2014/main" xmlns="" id="{CAD4AEF5-B2E4-4DAC-BA85-BD6524903309}"/>
                 </a:ext>
               </a:extLst>
             </p:cNvPr>
@@ -25874,7 +25874,7 @@
             <p:cNvPr id="15" name="Freeform 105">
               <a:extLst>
                 <a:ext uri="{FF2B5EF4-FFF2-40B4-BE49-F238E27FC236}">
-                  <a16:creationId xmlns="" xmlns:a16="http://schemas.microsoft.com/office/drawing/2014/main" id="{2C5F3221-5660-4FDD-A416-984B16B5ADAE}"/>
+                  <a16:creationId xmlns:a16="http://schemas.microsoft.com/office/drawing/2014/main" xmlns="" id="{2C5F3221-5660-4FDD-A416-984B16B5ADAE}"/>
                 </a:ext>
               </a:extLst>
             </p:cNvPr>
@@ -26116,7 +26116,7 @@
             <p:cNvPr id="16" name="Freeform 106">
               <a:extLst>
                 <a:ext uri="{FF2B5EF4-FFF2-40B4-BE49-F238E27FC236}">
-                  <a16:creationId xmlns="" xmlns:a16="http://schemas.microsoft.com/office/drawing/2014/main" id="{3619E9EE-CA2A-4A7E-9595-15737C18E0BF}"/>
+                  <a16:creationId xmlns:a16="http://schemas.microsoft.com/office/drawing/2014/main" xmlns="" id="{3619E9EE-CA2A-4A7E-9595-15737C18E0BF}"/>
                 </a:ext>
               </a:extLst>
             </p:cNvPr>
@@ -26218,7 +26218,7 @@
             <p:cNvPr id="17" name="Freeform 107">
               <a:extLst>
                 <a:ext uri="{FF2B5EF4-FFF2-40B4-BE49-F238E27FC236}">
-                  <a16:creationId xmlns="" xmlns:a16="http://schemas.microsoft.com/office/drawing/2014/main" id="{2D49FD2E-3838-4146-A460-681CDCDDDF9A}"/>
+                  <a16:creationId xmlns:a16="http://schemas.microsoft.com/office/drawing/2014/main" xmlns="" id="{2D49FD2E-3838-4146-A460-681CDCDDDF9A}"/>
                 </a:ext>
               </a:extLst>
             </p:cNvPr>
@@ -26320,7 +26320,7 @@
             <p:cNvPr id="18" name="Freeform 108">
               <a:extLst>
                 <a:ext uri="{FF2B5EF4-FFF2-40B4-BE49-F238E27FC236}">
-                  <a16:creationId xmlns="" xmlns:a16="http://schemas.microsoft.com/office/drawing/2014/main" id="{BC1FDE14-1AFF-4866-A13A-D78663B3ACF4}"/>
+                  <a16:creationId xmlns:a16="http://schemas.microsoft.com/office/drawing/2014/main" xmlns="" id="{BC1FDE14-1AFF-4866-A13A-D78663B3ACF4}"/>
                 </a:ext>
               </a:extLst>
             </p:cNvPr>
@@ -26422,7 +26422,7 @@
             <p:cNvPr id="19" name="Freeform 109">
               <a:extLst>
                 <a:ext uri="{FF2B5EF4-FFF2-40B4-BE49-F238E27FC236}">
-                  <a16:creationId xmlns="" xmlns:a16="http://schemas.microsoft.com/office/drawing/2014/main" id="{063D068F-339C-47BA-9092-606776DB4837}"/>
+                  <a16:creationId xmlns:a16="http://schemas.microsoft.com/office/drawing/2014/main" xmlns="" id="{063D068F-339C-47BA-9092-606776DB4837}"/>
                 </a:ext>
               </a:extLst>
             </p:cNvPr>
@@ -26574,7 +26574,7 @@
             <p:cNvPr id="20" name="Freeform 110">
               <a:extLst>
                 <a:ext uri="{FF2B5EF4-FFF2-40B4-BE49-F238E27FC236}">
-                  <a16:creationId xmlns="" xmlns:a16="http://schemas.microsoft.com/office/drawing/2014/main" id="{9EF6ADF9-E415-44BA-8A09-ACF76BF6F157}"/>
+                  <a16:creationId xmlns:a16="http://schemas.microsoft.com/office/drawing/2014/main" xmlns="" id="{9EF6ADF9-E415-44BA-8A09-ACF76BF6F157}"/>
                 </a:ext>
               </a:extLst>
             </p:cNvPr>
@@ -26946,7 +26946,7 @@
             <p:cNvPr id="21" name="Freeform 111">
               <a:extLst>
                 <a:ext uri="{FF2B5EF4-FFF2-40B4-BE49-F238E27FC236}">
-                  <a16:creationId xmlns="" xmlns:a16="http://schemas.microsoft.com/office/drawing/2014/main" id="{4AA15E7F-EACA-4AFC-A266-9457685D2FD1}"/>
+                  <a16:creationId xmlns:a16="http://schemas.microsoft.com/office/drawing/2014/main" xmlns="" id="{4AA15E7F-EACA-4AFC-A266-9457685D2FD1}"/>
                 </a:ext>
               </a:extLst>
             </p:cNvPr>
@@ -27118,7 +27118,7 @@
             <p:cNvPr id="22" name="Freeform 112">
               <a:extLst>
                 <a:ext uri="{FF2B5EF4-FFF2-40B4-BE49-F238E27FC236}">
-                  <a16:creationId xmlns="" xmlns:a16="http://schemas.microsoft.com/office/drawing/2014/main" id="{9ABAD878-1B58-4815-BC91-D56C1C154D07}"/>
+                  <a16:creationId xmlns:a16="http://schemas.microsoft.com/office/drawing/2014/main" xmlns="" id="{9ABAD878-1B58-4815-BC91-D56C1C154D07}"/>
                 </a:ext>
               </a:extLst>
             </p:cNvPr>
@@ -27560,7 +27560,7 @@
             <p:cNvPr id="23" name="Freeform 113">
               <a:extLst>
                 <a:ext uri="{FF2B5EF4-FFF2-40B4-BE49-F238E27FC236}">
-                  <a16:creationId xmlns="" xmlns:a16="http://schemas.microsoft.com/office/drawing/2014/main" id="{C8DD0AFC-3A0F-4444-B0BC-D95D547454BB}"/>
+                  <a16:creationId xmlns:a16="http://schemas.microsoft.com/office/drawing/2014/main" xmlns="" id="{C8DD0AFC-3A0F-4444-B0BC-D95D547454BB}"/>
                 </a:ext>
               </a:extLst>
             </p:cNvPr>
@@ -27942,7 +27942,7 @@
             <p:cNvPr id="24" name="Freeform 114">
               <a:extLst>
                 <a:ext uri="{FF2B5EF4-FFF2-40B4-BE49-F238E27FC236}">
-                  <a16:creationId xmlns="" xmlns:a16="http://schemas.microsoft.com/office/drawing/2014/main" id="{F2AE930D-887F-4A52-A067-9C77D031CF63}"/>
+                  <a16:creationId xmlns:a16="http://schemas.microsoft.com/office/drawing/2014/main" xmlns="" id="{F2AE930D-887F-4A52-A067-9C77D031CF63}"/>
                 </a:ext>
               </a:extLst>
             </p:cNvPr>
@@ -28334,7 +28334,7 @@
             <p:cNvPr id="25" name="Freeform 115">
               <a:extLst>
                 <a:ext uri="{FF2B5EF4-FFF2-40B4-BE49-F238E27FC236}">
-                  <a16:creationId xmlns="" xmlns:a16="http://schemas.microsoft.com/office/drawing/2014/main" id="{22C58FBE-8B90-4D60-9771-267B7DF94962}"/>
+                  <a16:creationId xmlns:a16="http://schemas.microsoft.com/office/drawing/2014/main" xmlns="" id="{22C58FBE-8B90-4D60-9771-267B7DF94962}"/>
                 </a:ext>
               </a:extLst>
             </p:cNvPr>
@@ -28606,7 +28606,7 @@
             <p:cNvPr id="26" name="Freeform 116">
               <a:extLst>
                 <a:ext uri="{FF2B5EF4-FFF2-40B4-BE49-F238E27FC236}">
-                  <a16:creationId xmlns="" xmlns:a16="http://schemas.microsoft.com/office/drawing/2014/main" id="{16ACB36B-9D6A-4514-979B-E4B5E882725B}"/>
+                  <a16:creationId xmlns:a16="http://schemas.microsoft.com/office/drawing/2014/main" xmlns="" id="{16ACB36B-9D6A-4514-979B-E4B5E882725B}"/>
                 </a:ext>
               </a:extLst>
             </p:cNvPr>
@@ -28758,7 +28758,7 @@
             <p:cNvPr id="27" name="Freeform 117">
               <a:extLst>
                 <a:ext uri="{FF2B5EF4-FFF2-40B4-BE49-F238E27FC236}">
-                  <a16:creationId xmlns="" xmlns:a16="http://schemas.microsoft.com/office/drawing/2014/main" id="{E56F45A1-3BA2-48D1-B694-90E2D7E5F00F}"/>
+                  <a16:creationId xmlns:a16="http://schemas.microsoft.com/office/drawing/2014/main" xmlns="" id="{E56F45A1-3BA2-48D1-B694-90E2D7E5F00F}"/>
                 </a:ext>
               </a:extLst>
             </p:cNvPr>
@@ -28890,7 +28890,7 @@
             <p:cNvPr id="28" name="Freeform 118">
               <a:extLst>
                 <a:ext uri="{FF2B5EF4-FFF2-40B4-BE49-F238E27FC236}">
-                  <a16:creationId xmlns="" xmlns:a16="http://schemas.microsoft.com/office/drawing/2014/main" id="{538E39C8-6031-47A8-88F1-CF9012F1A85A}"/>
+                  <a16:creationId xmlns:a16="http://schemas.microsoft.com/office/drawing/2014/main" xmlns="" id="{538E39C8-6031-47A8-88F1-CF9012F1A85A}"/>
                 </a:ext>
               </a:extLst>
             </p:cNvPr>
@@ -29112,7 +29112,7 @@
             <p:cNvPr id="29" name="Freeform 119">
               <a:extLst>
                 <a:ext uri="{FF2B5EF4-FFF2-40B4-BE49-F238E27FC236}">
-                  <a16:creationId xmlns="" xmlns:a16="http://schemas.microsoft.com/office/drawing/2014/main" id="{D6D88D87-1A88-4DA3-84EA-348D6C165178}"/>
+                  <a16:creationId xmlns:a16="http://schemas.microsoft.com/office/drawing/2014/main" xmlns="" id="{D6D88D87-1A88-4DA3-84EA-348D6C165178}"/>
                 </a:ext>
               </a:extLst>
             </p:cNvPr>
@@ -29334,7 +29334,7 @@
             <p:cNvPr id="30" name="Freeform 120">
               <a:extLst>
                 <a:ext uri="{FF2B5EF4-FFF2-40B4-BE49-F238E27FC236}">
-                  <a16:creationId xmlns="" xmlns:a16="http://schemas.microsoft.com/office/drawing/2014/main" id="{F0B5ACCA-D6E1-45B2-81B9-6347C94E21DF}"/>
+                  <a16:creationId xmlns:a16="http://schemas.microsoft.com/office/drawing/2014/main" xmlns="" id="{F0B5ACCA-D6E1-45B2-81B9-6347C94E21DF}"/>
                 </a:ext>
               </a:extLst>
             </p:cNvPr>
@@ -29556,7 +29556,7 @@
             <p:cNvPr id="31" name="Freeform 121">
               <a:extLst>
                 <a:ext uri="{FF2B5EF4-FFF2-40B4-BE49-F238E27FC236}">
-                  <a16:creationId xmlns="" xmlns:a16="http://schemas.microsoft.com/office/drawing/2014/main" id="{174726A2-EDA9-46A3-93A1-03BE06A124F2}"/>
+                  <a16:creationId xmlns:a16="http://schemas.microsoft.com/office/drawing/2014/main" xmlns="" id="{174726A2-EDA9-46A3-93A1-03BE06A124F2}"/>
                 </a:ext>
               </a:extLst>
             </p:cNvPr>
@@ -29818,7 +29818,7 @@
             <p:cNvPr id="32" name="Freeform 122">
               <a:extLst>
                 <a:ext uri="{FF2B5EF4-FFF2-40B4-BE49-F238E27FC236}">
-                  <a16:creationId xmlns="" xmlns:a16="http://schemas.microsoft.com/office/drawing/2014/main" id="{5A8E0F72-9753-459A-B28D-417391CFB229}"/>
+                  <a16:creationId xmlns:a16="http://schemas.microsoft.com/office/drawing/2014/main" xmlns="" id="{5A8E0F72-9753-459A-B28D-417391CFB229}"/>
                 </a:ext>
               </a:extLst>
             </p:cNvPr>
@@ -30000,7 +30000,7 @@
             <p:cNvPr id="33" name="Freeform 123">
               <a:extLst>
                 <a:ext uri="{FF2B5EF4-FFF2-40B4-BE49-F238E27FC236}">
-                  <a16:creationId xmlns="" xmlns:a16="http://schemas.microsoft.com/office/drawing/2014/main" id="{3320A7A6-6BBF-4A10-AE74-EF784C22B39A}"/>
+                  <a16:creationId xmlns:a16="http://schemas.microsoft.com/office/drawing/2014/main" xmlns="" id="{3320A7A6-6BBF-4A10-AE74-EF784C22B39A}"/>
                 </a:ext>
               </a:extLst>
             </p:cNvPr>
@@ -30162,7 +30162,7 @@
             <p:cNvPr id="34" name="Freeform 124">
               <a:extLst>
                 <a:ext uri="{FF2B5EF4-FFF2-40B4-BE49-F238E27FC236}">
-                  <a16:creationId xmlns="" xmlns:a16="http://schemas.microsoft.com/office/drawing/2014/main" id="{02807F45-F5C7-4758-8C09-1F9D9FB9ECFC}"/>
+                  <a16:creationId xmlns:a16="http://schemas.microsoft.com/office/drawing/2014/main" xmlns="" id="{02807F45-F5C7-4758-8C09-1F9D9FB9ECFC}"/>
                 </a:ext>
               </a:extLst>
             </p:cNvPr>
@@ -30404,7 +30404,7 @@
             <p:cNvPr id="35" name="Freeform 125">
               <a:extLst>
                 <a:ext uri="{FF2B5EF4-FFF2-40B4-BE49-F238E27FC236}">
-                  <a16:creationId xmlns="" xmlns:a16="http://schemas.microsoft.com/office/drawing/2014/main" id="{A6672E50-E5DE-4643-932F-C7CAC9261D23}"/>
+                  <a16:creationId xmlns:a16="http://schemas.microsoft.com/office/drawing/2014/main" xmlns="" id="{A6672E50-E5DE-4643-932F-C7CAC9261D23}"/>
                 </a:ext>
               </a:extLst>
             </p:cNvPr>
@@ -30666,7 +30666,7 @@
             <p:cNvPr id="36" name="Freeform 126">
               <a:extLst>
                 <a:ext uri="{FF2B5EF4-FFF2-40B4-BE49-F238E27FC236}">
-                  <a16:creationId xmlns="" xmlns:a16="http://schemas.microsoft.com/office/drawing/2014/main" id="{EA089E74-B78F-4ACE-8046-EB079E2FCF56}"/>
+                  <a16:creationId xmlns:a16="http://schemas.microsoft.com/office/drawing/2014/main" xmlns="" id="{EA089E74-B78F-4ACE-8046-EB079E2FCF56}"/>
                 </a:ext>
               </a:extLst>
             </p:cNvPr>
@@ -30930,7 +30930,7 @@
           <p:cNvPr id="3" name="Título 1">
             <a:extLst>
               <a:ext uri="{FF2B5EF4-FFF2-40B4-BE49-F238E27FC236}">
-                <a16:creationId xmlns="" xmlns:a16="http://schemas.microsoft.com/office/drawing/2014/main" id="{C74FDE85-A811-49B8-BCA5-144B3BF9178F}"/>
+                <a16:creationId xmlns:a16="http://schemas.microsoft.com/office/drawing/2014/main" xmlns="" id="{C74FDE85-A811-49B8-BCA5-144B3BF9178F}"/>
               </a:ext>
             </a:extLst>
           </p:cNvPr>
@@ -30987,7 +30987,7 @@
           <p:cNvPr id="12" name="Imagen 11">
             <a:extLst>
               <a:ext uri="{FF2B5EF4-FFF2-40B4-BE49-F238E27FC236}">
-                <a16:creationId xmlns="" xmlns:a16="http://schemas.microsoft.com/office/drawing/2014/main" id="{0633DF26-E03C-49B7-8009-B152436760EA}"/>
+                <a16:creationId xmlns:a16="http://schemas.microsoft.com/office/drawing/2014/main" xmlns="" id="{0633DF26-E03C-49B7-8009-B152436760EA}"/>
               </a:ext>
             </a:extLst>
           </p:cNvPr>
@@ -31246,7 +31246,7 @@
           <p:cNvPr id="3" name="Título 1">
             <a:extLst>
               <a:ext uri="{FF2B5EF4-FFF2-40B4-BE49-F238E27FC236}">
-                <a16:creationId xmlns="" xmlns:a16="http://schemas.microsoft.com/office/drawing/2014/main" id="{C74FDE85-A811-49B8-BCA5-144B3BF9178F}"/>
+                <a16:creationId xmlns:a16="http://schemas.microsoft.com/office/drawing/2014/main" xmlns="" id="{C74FDE85-A811-49B8-BCA5-144B3BF9178F}"/>
               </a:ext>
             </a:extLst>
           </p:cNvPr>
@@ -31336,7 +31336,7 @@
           <p:cNvPr id="12" name="Imagen 11">
             <a:extLst>
               <a:ext uri="{FF2B5EF4-FFF2-40B4-BE49-F238E27FC236}">
-                <a16:creationId xmlns="" xmlns:a16="http://schemas.microsoft.com/office/drawing/2014/main" id="{0633DF26-E03C-49B7-8009-B152436760EA}"/>
+                <a16:creationId xmlns:a16="http://schemas.microsoft.com/office/drawing/2014/main" xmlns="" id="{0633DF26-E03C-49B7-8009-B152436760EA}"/>
               </a:ext>
             </a:extLst>
           </p:cNvPr>
@@ -31664,7 +31664,7 @@
           <p:cNvPr id="3" name="Título 1">
             <a:extLst>
               <a:ext uri="{FF2B5EF4-FFF2-40B4-BE49-F238E27FC236}">
-                <a16:creationId xmlns="" xmlns:a16="http://schemas.microsoft.com/office/drawing/2014/main" id="{C74FDE85-A811-49B8-BCA5-144B3BF9178F}"/>
+                <a16:creationId xmlns:a16="http://schemas.microsoft.com/office/drawing/2014/main" xmlns="" id="{C74FDE85-A811-49B8-BCA5-144B3BF9178F}"/>
               </a:ext>
             </a:extLst>
           </p:cNvPr>
@@ -31742,7 +31742,7 @@
           <p:cNvPr id="12" name="Imagen 11">
             <a:extLst>
               <a:ext uri="{FF2B5EF4-FFF2-40B4-BE49-F238E27FC236}">
-                <a16:creationId xmlns="" xmlns:a16="http://schemas.microsoft.com/office/drawing/2014/main" id="{0633DF26-E03C-49B7-8009-B152436760EA}"/>
+                <a16:creationId xmlns:a16="http://schemas.microsoft.com/office/drawing/2014/main" xmlns="" id="{0633DF26-E03C-49B7-8009-B152436760EA}"/>
               </a:ext>
             </a:extLst>
           </p:cNvPr>
@@ -32454,7 +32454,7 @@
           <p:cNvPr id="3" name="Título 1">
             <a:extLst>
               <a:ext uri="{FF2B5EF4-FFF2-40B4-BE49-F238E27FC236}">
-                <a16:creationId xmlns="" xmlns:a16="http://schemas.microsoft.com/office/drawing/2014/main" id="{C74FDE85-A811-49B8-BCA5-144B3BF9178F}"/>
+                <a16:creationId xmlns:a16="http://schemas.microsoft.com/office/drawing/2014/main" xmlns="" id="{C74FDE85-A811-49B8-BCA5-144B3BF9178F}"/>
               </a:ext>
             </a:extLst>
           </p:cNvPr>
@@ -32520,7 +32520,7 @@
           <p:cNvPr id="12" name="Imagen 11">
             <a:extLst>
               <a:ext uri="{FF2B5EF4-FFF2-40B4-BE49-F238E27FC236}">
-                <a16:creationId xmlns="" xmlns:a16="http://schemas.microsoft.com/office/drawing/2014/main" id="{0633DF26-E03C-49B7-8009-B152436760EA}"/>
+                <a16:creationId xmlns:a16="http://schemas.microsoft.com/office/drawing/2014/main" xmlns="" id="{0633DF26-E03C-49B7-8009-B152436760EA}"/>
               </a:ext>
             </a:extLst>
           </p:cNvPr>
@@ -32822,7 +32822,7 @@
           <p:cNvPr id="3" name="Título 1">
             <a:extLst>
               <a:ext uri="{FF2B5EF4-FFF2-40B4-BE49-F238E27FC236}">
-                <a16:creationId xmlns="" xmlns:a16="http://schemas.microsoft.com/office/drawing/2014/main" id="{C74FDE85-A811-49B8-BCA5-144B3BF9178F}"/>
+                <a16:creationId xmlns:a16="http://schemas.microsoft.com/office/drawing/2014/main" xmlns="" id="{C74FDE85-A811-49B8-BCA5-144B3BF9178F}"/>
               </a:ext>
             </a:extLst>
           </p:cNvPr>
@@ -32888,7 +32888,7 @@
           <p:cNvPr id="12" name="Imagen 11">
             <a:extLst>
               <a:ext uri="{FF2B5EF4-FFF2-40B4-BE49-F238E27FC236}">
-                <a16:creationId xmlns="" xmlns:a16="http://schemas.microsoft.com/office/drawing/2014/main" id="{0633DF26-E03C-49B7-8009-B152436760EA}"/>
+                <a16:creationId xmlns:a16="http://schemas.microsoft.com/office/drawing/2014/main" xmlns="" id="{0633DF26-E03C-49B7-8009-B152436760EA}"/>
               </a:ext>
             </a:extLst>
           </p:cNvPr>
@@ -33017,7 +33017,7 @@
         <p:spPr>
           <a:xfrm>
             <a:off x="88900" y="1816100"/>
-            <a:ext cx="10541000" cy="3139321"/>
+            <a:ext cx="10541000" cy="3416320"/>
           </a:xfrm>
           <a:prstGeom prst="rect">
             <a:avLst/>
@@ -33084,8 +33084,23 @@
             </a:pPr>
             <a:r>
               <a:rPr lang="es-CO" dirty="0" smtClean="0"/>
-              <a:t>Como es el principal, extenderlo que ocupe toda la pantalla</a:t>
+              <a:t>Como es el principal, extenderlo que ocupe toda la </a:t>
             </a:r>
+            <a:r>
+              <a:rPr lang="es-CO" dirty="0" smtClean="0"/>
+              <a:t>pantalla</a:t>
+            </a:r>
+          </a:p>
+          <a:p>
+            <a:pPr marL="342900" indent="-342900">
+              <a:buFont typeface="Arial" panose="020B0604020202020204" pitchFamily="34" charset="0"/>
+              <a:buChar char="•"/>
+            </a:pPr>
+            <a:r>
+              <a:rPr lang="es-CO" dirty="0" smtClean="0"/>
+              <a:t>Crear el escritorio en el Formulario</a:t>
+            </a:r>
+            <a:endParaRPr lang="es-CO" dirty="0" smtClean="0"/>
           </a:p>
           <a:p>
             <a:pPr marL="342900" indent="-342900">
@@ -33243,7 +33258,7 @@
           <p:cNvPr id="12" name="Imagen 11">
             <a:extLst>
               <a:ext uri="{FF2B5EF4-FFF2-40B4-BE49-F238E27FC236}">
-                <a16:creationId xmlns="" xmlns:a16="http://schemas.microsoft.com/office/drawing/2014/main" id="{0633DF26-E03C-49B7-8009-B152436760EA}"/>
+                <a16:creationId xmlns:a16="http://schemas.microsoft.com/office/drawing/2014/main" xmlns="" id="{0633DF26-E03C-49B7-8009-B152436760EA}"/>
               </a:ext>
             </a:extLst>
           </p:cNvPr>
@@ -33398,7 +33413,7 @@
           <p:cNvPr id="10" name="Título 1">
             <a:extLst>
               <a:ext uri="{FF2B5EF4-FFF2-40B4-BE49-F238E27FC236}">
-                <a16:creationId xmlns="" xmlns:a16="http://schemas.microsoft.com/office/drawing/2014/main" id="{C74FDE85-A811-49B8-BCA5-144B3BF9178F}"/>
+                <a16:creationId xmlns:a16="http://schemas.microsoft.com/office/drawing/2014/main" xmlns="" id="{C74FDE85-A811-49B8-BCA5-144B3BF9178F}"/>
               </a:ext>
             </a:extLst>
           </p:cNvPr>
@@ -33601,7 +33616,7 @@
           <p:cNvPr id="4" name="Título 1">
             <a:extLst>
               <a:ext uri="{FF2B5EF4-FFF2-40B4-BE49-F238E27FC236}">
-                <a16:creationId xmlns="" xmlns:a16="http://schemas.microsoft.com/office/drawing/2014/main" id="{C74FDE85-A811-49B8-BCA5-144B3BF9178F}"/>
+                <a16:creationId xmlns:a16="http://schemas.microsoft.com/office/drawing/2014/main" xmlns="" id="{C74FDE85-A811-49B8-BCA5-144B3BF9178F}"/>
               </a:ext>
             </a:extLst>
           </p:cNvPr>
@@ -33887,7 +33902,7 @@
           <p:cNvPr id="3" name="Título 1">
             <a:extLst>
               <a:ext uri="{FF2B5EF4-FFF2-40B4-BE49-F238E27FC236}">
-                <a16:creationId xmlns="" xmlns:a16="http://schemas.microsoft.com/office/drawing/2014/main" id="{C74FDE85-A811-49B8-BCA5-144B3BF9178F}"/>
+                <a16:creationId xmlns:a16="http://schemas.microsoft.com/office/drawing/2014/main" xmlns="" id="{C74FDE85-A811-49B8-BCA5-144B3BF9178F}"/>
               </a:ext>
             </a:extLst>
           </p:cNvPr>
@@ -33944,7 +33959,7 @@
           <p:cNvPr id="12" name="Imagen 11">
             <a:extLst>
               <a:ext uri="{FF2B5EF4-FFF2-40B4-BE49-F238E27FC236}">
-                <a16:creationId xmlns="" xmlns:a16="http://schemas.microsoft.com/office/drawing/2014/main" id="{0633DF26-E03C-49B7-8009-B152436760EA}"/>
+                <a16:creationId xmlns:a16="http://schemas.microsoft.com/office/drawing/2014/main" xmlns="" id="{0633DF26-E03C-49B7-8009-B152436760EA}"/>
               </a:ext>
             </a:extLst>
           </p:cNvPr>
@@ -34153,7 +34168,7 @@
           <p:cNvPr id="10" name="Título 1">
             <a:extLst>
               <a:ext uri="{FF2B5EF4-FFF2-40B4-BE49-F238E27FC236}">
-                <a16:creationId xmlns="" xmlns:a16="http://schemas.microsoft.com/office/drawing/2014/main" id="{C74FDE85-A811-49B8-BCA5-144B3BF9178F}"/>
+                <a16:creationId xmlns:a16="http://schemas.microsoft.com/office/drawing/2014/main" xmlns="" id="{C74FDE85-A811-49B8-BCA5-144B3BF9178F}"/>
               </a:ext>
             </a:extLst>
           </p:cNvPr>
@@ -34256,7 +34271,7 @@
           <p:cNvPr id="3" name="Título 1">
             <a:extLst>
               <a:ext uri="{FF2B5EF4-FFF2-40B4-BE49-F238E27FC236}">
-                <a16:creationId xmlns="" xmlns:a16="http://schemas.microsoft.com/office/drawing/2014/main" id="{C74FDE85-A811-49B8-BCA5-144B3BF9178F}"/>
+                <a16:creationId xmlns:a16="http://schemas.microsoft.com/office/drawing/2014/main" xmlns="" id="{C74FDE85-A811-49B8-BCA5-144B3BF9178F}"/>
               </a:ext>
             </a:extLst>
           </p:cNvPr>
@@ -34313,7 +34328,7 @@
           <p:cNvPr id="12" name="Imagen 11">
             <a:extLst>
               <a:ext uri="{FF2B5EF4-FFF2-40B4-BE49-F238E27FC236}">
-                <a16:creationId xmlns="" xmlns:a16="http://schemas.microsoft.com/office/drawing/2014/main" id="{0633DF26-E03C-49B7-8009-B152436760EA}"/>
+                <a16:creationId xmlns:a16="http://schemas.microsoft.com/office/drawing/2014/main" xmlns="" id="{0633DF26-E03C-49B7-8009-B152436760EA}"/>
               </a:ext>
             </a:extLst>
           </p:cNvPr>
@@ -34522,7 +34537,7 @@
           <p:cNvPr id="10" name="Título 1">
             <a:extLst>
               <a:ext uri="{FF2B5EF4-FFF2-40B4-BE49-F238E27FC236}">
-                <a16:creationId xmlns="" xmlns:a16="http://schemas.microsoft.com/office/drawing/2014/main" id="{C74FDE85-A811-49B8-BCA5-144B3BF9178F}"/>
+                <a16:creationId xmlns:a16="http://schemas.microsoft.com/office/drawing/2014/main" xmlns="" id="{C74FDE85-A811-49B8-BCA5-144B3BF9178F}"/>
               </a:ext>
             </a:extLst>
           </p:cNvPr>

</xml_diff>